<commit_message>
Ploting histograms and added input files
</commit_message>
<xml_diff>
--- a/BWT and NW.pptx
+++ b/BWT and NW.pptx
@@ -13,8 +13,8 @@
     <p:sldId id="261" r:id="rId7"/>
     <p:sldId id="262" r:id="rId8"/>
     <p:sldId id="263" r:id="rId9"/>
-    <p:sldId id="264" r:id="rId10"/>
-    <p:sldId id="267" r:id="rId11"/>
+    <p:sldId id="267" r:id="rId10"/>
+    <p:sldId id="264" r:id="rId11"/>
     <p:sldId id="268" r:id="rId12"/>
     <p:sldId id="265" r:id="rId13"/>
     <p:sldId id="266" r:id="rId14"/>
@@ -250,7 +250,7 @@
           <a:p>
             <a:fld id="{0190AA31-4104-4B50-8099-695605A57FDA}" type="datetimeFigureOut">
               <a:rPr lang="en-GB" smtClean="0"/>
-              <a:t>16/05/2021</a:t>
+              <a:t>31/05/2021</a:t>
             </a:fld>
             <a:endParaRPr lang="en-GB"/>
           </a:p>
@@ -432,7 +432,7 @@
           <a:p>
             <a:fld id="{0190AA31-4104-4B50-8099-695605A57FDA}" type="datetimeFigureOut">
               <a:rPr lang="en-GB" smtClean="0"/>
-              <a:t>16/05/2021</a:t>
+              <a:t>31/05/2021</a:t>
             </a:fld>
             <a:endParaRPr lang="en-GB"/>
           </a:p>
@@ -624,7 +624,7 @@
           <a:p>
             <a:fld id="{0190AA31-4104-4B50-8099-695605A57FDA}" type="datetimeFigureOut">
               <a:rPr lang="en-GB" smtClean="0"/>
-              <a:t>16/05/2021</a:t>
+              <a:t>31/05/2021</a:t>
             </a:fld>
             <a:endParaRPr lang="en-GB"/>
           </a:p>
@@ -806,7 +806,7 @@
           <a:p>
             <a:fld id="{0190AA31-4104-4B50-8099-695605A57FDA}" type="datetimeFigureOut">
               <a:rPr lang="en-GB" smtClean="0"/>
-              <a:t>16/05/2021</a:t>
+              <a:t>31/05/2021</a:t>
             </a:fld>
             <a:endParaRPr lang="en-GB"/>
           </a:p>
@@ -1010,7 +1010,7 @@
           <a:p>
             <a:fld id="{0190AA31-4104-4B50-8099-695605A57FDA}" type="datetimeFigureOut">
               <a:rPr lang="en-GB" smtClean="0"/>
-              <a:t>16/05/2021</a:t>
+              <a:t>31/05/2021</a:t>
             </a:fld>
             <a:endParaRPr lang="en-GB"/>
           </a:p>
@@ -1310,7 +1310,7 @@
           <a:p>
             <a:fld id="{0190AA31-4104-4B50-8099-695605A57FDA}" type="datetimeFigureOut">
               <a:rPr lang="en-GB" smtClean="0"/>
-              <a:t>16/05/2021</a:t>
+              <a:t>31/05/2021</a:t>
             </a:fld>
             <a:endParaRPr lang="en-GB"/>
           </a:p>
@@ -1744,7 +1744,7 @@
           <a:p>
             <a:fld id="{0190AA31-4104-4B50-8099-695605A57FDA}" type="datetimeFigureOut">
               <a:rPr lang="en-GB" smtClean="0"/>
-              <a:t>16/05/2021</a:t>
+              <a:t>31/05/2021</a:t>
             </a:fld>
             <a:endParaRPr lang="en-GB"/>
           </a:p>
@@ -1874,7 +1874,7 @@
           <a:p>
             <a:fld id="{0190AA31-4104-4B50-8099-695605A57FDA}" type="datetimeFigureOut">
               <a:rPr lang="en-GB" smtClean="0"/>
-              <a:t>16/05/2021</a:t>
+              <a:t>31/05/2021</a:t>
             </a:fld>
             <a:endParaRPr lang="en-GB"/>
           </a:p>
@@ -1981,7 +1981,7 @@
           <a:p>
             <a:fld id="{0190AA31-4104-4B50-8099-695605A57FDA}" type="datetimeFigureOut">
               <a:rPr lang="en-GB" smtClean="0"/>
-              <a:t>16/05/2021</a:t>
+              <a:t>31/05/2021</a:t>
             </a:fld>
             <a:endParaRPr lang="en-GB"/>
           </a:p>
@@ -2270,7 +2270,7 @@
           <a:p>
             <a:fld id="{0190AA31-4104-4B50-8099-695605A57FDA}" type="datetimeFigureOut">
               <a:rPr lang="en-GB" smtClean="0"/>
-              <a:t>16/05/2021</a:t>
+              <a:t>31/05/2021</a:t>
             </a:fld>
             <a:endParaRPr lang="en-GB"/>
           </a:p>
@@ -2539,7 +2539,7 @@
           <a:p>
             <a:fld id="{0190AA31-4104-4B50-8099-695605A57FDA}" type="datetimeFigureOut">
               <a:rPr lang="en-GB" smtClean="0"/>
-              <a:t>16/05/2021</a:t>
+              <a:t>31/05/2021</a:t>
             </a:fld>
             <a:endParaRPr lang="en-GB"/>
           </a:p>
@@ -2867,7 +2867,7 @@
           <a:p>
             <a:fld id="{0190AA31-4104-4B50-8099-695605A57FDA}" type="datetimeFigureOut">
               <a:rPr lang="en-GB" smtClean="0"/>
-              <a:t>16/05/2021</a:t>
+              <a:t>31/05/2021</a:t>
             </a:fld>
             <a:endParaRPr lang="en-GB"/>
           </a:p>
@@ -3716,7 +3716,7 @@
       </p:grpSpPr>
       <p:sp>
         <p:nvSpPr>
-          <p:cNvPr id="3" name="Title 1"/>
+          <p:cNvPr id="2" name="Title 1"/>
           <p:cNvSpPr>
             <a:spLocks noGrp="1"/>
           </p:cNvSpPr>
@@ -3760,7 +3760,7 @@
       </p:sp>
       <p:pic>
         <p:nvPicPr>
-          <p:cNvPr id="9218" name="Picture 2"/>
+          <p:cNvPr id="8194" name="Picture 2"/>
           <p:cNvPicPr>
             <a:picLocks noChangeAspect="1" noChangeArrowheads="1"/>
           </p:cNvPicPr>
@@ -3781,8 +3781,8 @@
         </p:blipFill>
         <p:spPr bwMode="auto">
           <a:xfrm>
-            <a:off x="323528" y="1067949"/>
-            <a:ext cx="1907838" cy="1795506"/>
+            <a:off x="395536" y="1340768"/>
+            <a:ext cx="1584176" cy="1530829"/>
           </a:xfrm>
           <a:prstGeom prst="rect">
             <a:avLst/>
@@ -3824,7 +3824,7 @@
       </p:pic>
       <p:pic>
         <p:nvPicPr>
-          <p:cNvPr id="9219" name="Picture 3"/>
+          <p:cNvPr id="8195" name="Picture 3"/>
           <p:cNvPicPr>
             <a:picLocks noChangeAspect="1" noChangeArrowheads="1"/>
           </p:cNvPicPr>
@@ -3846,7 +3846,7 @@
         <p:spPr bwMode="auto">
           <a:xfrm>
             <a:off x="899592" y="3068960"/>
-            <a:ext cx="3245356" cy="3096344"/>
+            <a:ext cx="3168352" cy="2893046"/>
           </a:xfrm>
           <a:prstGeom prst="rect">
             <a:avLst/>
@@ -3888,7 +3888,7 @@
       </p:pic>
       <p:pic>
         <p:nvPicPr>
-          <p:cNvPr id="9220" name="Picture 4"/>
+          <p:cNvPr id="8196" name="Picture 4"/>
           <p:cNvPicPr>
             <a:picLocks noChangeAspect="1" noChangeArrowheads="1"/>
           </p:cNvPicPr>
@@ -3909,8 +3909,8 @@
         </p:blipFill>
         <p:spPr bwMode="auto">
           <a:xfrm>
-            <a:off x="4355976" y="2060848"/>
-            <a:ext cx="4520264" cy="4104456"/>
+            <a:off x="4351428" y="2204864"/>
+            <a:ext cx="4119837" cy="3816424"/>
           </a:xfrm>
           <a:prstGeom prst="rect">
             <a:avLst/>
@@ -3953,13 +3953,20 @@
     </p:spTree>
     <p:extLst>
       <p:ext uri="{BB962C8B-B14F-4D97-AF65-F5344CB8AC3E}">
-        <p14:creationId xmlns:p14="http://schemas.microsoft.com/office/powerpoint/2010/main" val="670237913"/>
+        <p14:creationId xmlns:p14="http://schemas.microsoft.com/office/powerpoint/2010/main" val="532536579"/>
       </p:ext>
     </p:extLst>
   </p:cSld>
   <p:clrMapOvr>
     <a:masterClrMapping/>
   </p:clrMapOvr>
+  <p:timing>
+    <p:tnLst>
+      <p:par>
+        <p:cTn id="1" dur="indefinite" restart="never" nodeType="tmRoot"/>
+      </p:par>
+    </p:tnLst>
+  </p:timing>
 </p:sld>
 </file>
 
@@ -4098,6 +4105,13 @@
   <p:clrMapOvr>
     <a:masterClrMapping/>
   </p:clrMapOvr>
+  <p:timing>
+    <p:tnLst>
+      <p:par>
+        <p:cTn id="1" dur="indefinite" restart="never" nodeType="tmRoot"/>
+      </p:par>
+    </p:tnLst>
+  </p:timing>
 </p:sld>
 </file>
 
@@ -5985,15 +5999,7 @@
             </a:r>
             <a:r>
               <a:rPr lang="en-US" dirty="0" smtClean="0"/>
-              <a:t>] = [c[substring[last]][0], </a:t>
-            </a:r>
-            <a:r>
-              <a:rPr lang="en-US" dirty="0" smtClean="0"/>
-              <a:t>c[substring[last]][1]]</a:t>
-            </a:r>
-            <a:r>
-              <a:rPr lang="en-US" dirty="0" smtClean="0"/>
-              <a:t> </a:t>
+              <a:t>] = [c[substring[last]][0], c[substring[last]][1]] </a:t>
             </a:r>
           </a:p>
           <a:p>
@@ -6015,11 +6021,7 @@
             </a:r>
             <a:r>
               <a:rPr lang="en-US" dirty="0" smtClean="0"/>
-              <a:t>] = </a:t>
-            </a:r>
-            <a:r>
-              <a:rPr lang="en-US" dirty="0" smtClean="0"/>
-              <a:t>[c[substring[</a:t>
+              <a:t>] = [c[substring[</a:t>
             </a:r>
             <a:r>
               <a:rPr lang="en-US" dirty="0" err="1" smtClean="0"/>
@@ -7284,9 +7286,39 @@
           <a:chExt cx="0" cy="0"/>
         </a:xfrm>
       </p:grpSpPr>
-      <p:sp>
-        <p:nvSpPr>
-          <p:cNvPr id="2" name="Title 1"/>
+      <p:pic>
+        <p:nvPicPr>
+          <p:cNvPr id="2" name="Picture 1"/>
+          <p:cNvPicPr>
+            <a:picLocks noChangeAspect="1"/>
+          </p:cNvPicPr>
+          <p:nvPr/>
+        </p:nvPicPr>
+        <p:blipFill>
+          <a:blip r:embed="rId2">
+            <a:extLst>
+              <a:ext uri="{28A0092B-C50C-407E-A947-70E740481C1C}">
+                <a14:useLocalDpi xmlns:a14="http://schemas.microsoft.com/office/drawing/2010/main" val="0"/>
+              </a:ext>
+            </a:extLst>
+          </a:blip>
+          <a:stretch>
+            <a:fillRect/>
+          </a:stretch>
+        </p:blipFill>
+        <p:spPr>
+          <a:xfrm>
+            <a:off x="3491880" y="1340768"/>
+            <a:ext cx="5130570" cy="4104456"/>
+          </a:xfrm>
+          <a:prstGeom prst="rect">
+            <a:avLst/>
+          </a:prstGeom>
+        </p:spPr>
+      </p:pic>
+      <p:sp>
+        <p:nvSpPr>
+          <p:cNvPr id="3" name="Title 1"/>
           <p:cNvSpPr>
             <a:spLocks noGrp="1"/>
           </p:cNvSpPr>
@@ -7296,7 +7328,7 @@
         </p:nvSpPr>
         <p:spPr>
           <a:xfrm>
-            <a:off x="395536" y="764704"/>
+            <a:off x="430197" y="769268"/>
             <a:ext cx="8229600" cy="1143000"/>
           </a:xfrm>
         </p:spPr>
@@ -7328,202 +7360,150 @@
           </a:p>
         </p:txBody>
       </p:sp>
-      <p:pic>
-        <p:nvPicPr>
-          <p:cNvPr id="8194" name="Picture 2"/>
-          <p:cNvPicPr>
-            <a:picLocks noChangeAspect="1" noChangeArrowheads="1"/>
-          </p:cNvPicPr>
+      <p:sp>
+        <p:nvSpPr>
+          <p:cNvPr id="5" name="TextBox 4"/>
+          <p:cNvSpPr txBox="1"/>
           <p:nvPr/>
-        </p:nvPicPr>
-        <p:blipFill>
-          <a:blip r:embed="rId2" cstate="print">
-            <a:extLst>
-              <a:ext uri="{28A0092B-C50C-407E-A947-70E740481C1C}">
-                <a14:useLocalDpi xmlns:a14="http://schemas.microsoft.com/office/drawing/2010/main" val="0"/>
-              </a:ext>
-            </a:extLst>
-          </a:blip>
-          <a:srcRect/>
-          <a:stretch>
-            <a:fillRect/>
-          </a:stretch>
-        </p:blipFill>
-        <p:spPr bwMode="auto">
+        </p:nvSpPr>
+        <p:spPr>
           <a:xfrm>
-            <a:off x="395536" y="1340768"/>
-            <a:ext cx="1584176" cy="1530829"/>
+            <a:off x="179512" y="5229200"/>
+            <a:ext cx="6336704" cy="1200329"/>
           </a:xfrm>
           <a:prstGeom prst="rect">
             <a:avLst/>
           </a:prstGeom>
           <a:noFill/>
-          <a:ln>
-            <a:noFill/>
-          </a:ln>
-          <a:effectLst/>
-          <a:extLst>
-            <a:ext uri="{909E8E84-426E-40DD-AFC4-6F175D3DCCD1}">
-              <a14:hiddenFill xmlns:a14="http://schemas.microsoft.com/office/drawing/2010/main">
-                <a:solidFill>
-                  <a:schemeClr val="accent1"/>
-                </a:solidFill>
-              </a14:hiddenFill>
-            </a:ext>
-            <a:ext uri="{91240B29-F687-4F45-9708-019B960494DF}">
-              <a14:hiddenLine xmlns:a14="http://schemas.microsoft.com/office/drawing/2010/main" w="9525">
-                <a:solidFill>
-                  <a:schemeClr val="tx1"/>
-                </a:solidFill>
-                <a:miter lim="800000"/>
-                <a:headEnd/>
-                <a:tailEnd/>
-              </a14:hiddenLine>
-            </a:ext>
-            <a:ext uri="{AF507438-7753-43E0-B8FC-AC1667EBCBE1}">
-              <a14:hiddenEffects xmlns:a14="http://schemas.microsoft.com/office/drawing/2010/main">
-                <a:effectLst>
-                  <a:outerShdw dist="35921" dir="2700000" algn="ctr" rotWithShape="0">
-                    <a:schemeClr val="bg2"/>
-                  </a:outerShdw>
-                </a:effectLst>
-              </a14:hiddenEffects>
-            </a:ext>
-          </a:extLst>
         </p:spPr>
-      </p:pic>
-      <p:pic>
-        <p:nvPicPr>
-          <p:cNvPr id="8195" name="Picture 3"/>
-          <p:cNvPicPr>
-            <a:picLocks noChangeAspect="1" noChangeArrowheads="1"/>
-          </p:cNvPicPr>
+        <p:txBody>
+          <a:bodyPr wrap="square" rtlCol="0">
+            <a:spAutoFit/>
+          </a:bodyPr>
+          <a:lstStyle/>
+          <a:p>
+            <a:pPr marL="285750" indent="-285750">
+              <a:buFont typeface="Arial" panose="020B0604020202020204" pitchFamily="34" charset="0"/>
+              <a:buChar char="•"/>
+            </a:pPr>
+            <a:r>
+              <a:rPr lang="en-US" dirty="0" smtClean="0"/>
+              <a:t>total number of reads: </a:t>
+            </a:r>
+            <a:r>
+              <a:rPr lang="en-US" b="1" dirty="0" err="1" smtClean="0"/>
+              <a:t>20K</a:t>
+            </a:r>
+            <a:endParaRPr lang="en-US" b="1" dirty="0" smtClean="0"/>
+          </a:p>
+          <a:p>
+            <a:pPr marL="285750" indent="-285750">
+              <a:buFont typeface="Arial" panose="020B0604020202020204" pitchFamily="34" charset="0"/>
+              <a:buChar char="•"/>
+            </a:pPr>
+            <a:r>
+              <a:rPr lang="en-US" dirty="0" smtClean="0"/>
+              <a:t>number of non mapped reads: </a:t>
+            </a:r>
+            <a:r>
+              <a:rPr lang="en-US" b="1" dirty="0" smtClean="0"/>
+              <a:t>413</a:t>
+            </a:r>
+          </a:p>
+          <a:p>
+            <a:pPr marL="285750" indent="-285750">
+              <a:buFont typeface="Arial" panose="020B0604020202020204" pitchFamily="34" charset="0"/>
+              <a:buChar char="•"/>
+            </a:pPr>
+            <a:r>
+              <a:rPr lang="en-US" dirty="0" smtClean="0"/>
+              <a:t>number of reads mapped as </a:t>
+            </a:r>
+            <a:r>
+              <a:rPr lang="en-US" i="1" dirty="0" smtClean="0"/>
+              <a:t>reverse complement</a:t>
+            </a:r>
+            <a:r>
+              <a:rPr lang="en-US" dirty="0" smtClean="0"/>
+              <a:t>: </a:t>
+            </a:r>
+            <a:r>
+              <a:rPr lang="en-GB" b="1" dirty="0" smtClean="0"/>
+              <a:t>11478</a:t>
+            </a:r>
+            <a:endParaRPr lang="en-US" b="1" dirty="0" smtClean="0"/>
+          </a:p>
+          <a:p>
+            <a:pPr marL="285750" indent="-285750">
+              <a:buFont typeface="Arial" panose="020B0604020202020204" pitchFamily="34" charset="0"/>
+              <a:buChar char="•"/>
+            </a:pPr>
+            <a:r>
+              <a:rPr lang="en-US" dirty="0" smtClean="0"/>
+              <a:t>number of reads normally mapped: </a:t>
+            </a:r>
+            <a:r>
+              <a:rPr lang="en-US" b="1" dirty="0" smtClean="0"/>
+              <a:t>8109</a:t>
+            </a:r>
+            <a:endParaRPr lang="en-GB" b="1" dirty="0"/>
+          </a:p>
+        </p:txBody>
+      </p:sp>
+      <p:sp>
+        <p:nvSpPr>
+          <p:cNvPr id="6" name="TextBox 5"/>
+          <p:cNvSpPr txBox="1"/>
           <p:nvPr/>
-        </p:nvPicPr>
-        <p:blipFill>
-          <a:blip r:embed="rId3" cstate="print">
-            <a:extLst>
-              <a:ext uri="{28A0092B-C50C-407E-A947-70E740481C1C}">
-                <a14:useLocalDpi xmlns:a14="http://schemas.microsoft.com/office/drawing/2010/main" val="0"/>
-              </a:ext>
-            </a:extLst>
-          </a:blip>
-          <a:srcRect/>
-          <a:stretch>
-            <a:fillRect/>
-          </a:stretch>
-        </p:blipFill>
-        <p:spPr bwMode="auto">
+        </p:nvSpPr>
+        <p:spPr>
           <a:xfrm>
-            <a:off x="899592" y="3068960"/>
-            <a:ext cx="3168352" cy="2893046"/>
+            <a:off x="323528" y="2792831"/>
+            <a:ext cx="3096344" cy="1200329"/>
           </a:xfrm>
           <a:prstGeom prst="rect">
             <a:avLst/>
           </a:prstGeom>
           <a:noFill/>
-          <a:ln>
-            <a:noFill/>
-          </a:ln>
-          <a:effectLst/>
-          <a:extLst>
-            <a:ext uri="{909E8E84-426E-40DD-AFC4-6F175D3DCCD1}">
-              <a14:hiddenFill xmlns:a14="http://schemas.microsoft.com/office/drawing/2010/main">
-                <a:solidFill>
-                  <a:schemeClr val="accent1"/>
-                </a:solidFill>
-              </a14:hiddenFill>
-            </a:ext>
-            <a:ext uri="{91240B29-F687-4F45-9708-019B960494DF}">
-              <a14:hiddenLine xmlns:a14="http://schemas.microsoft.com/office/drawing/2010/main" w="9525">
-                <a:solidFill>
-                  <a:schemeClr val="tx1"/>
-                </a:solidFill>
-                <a:miter lim="800000"/>
-                <a:headEnd/>
-                <a:tailEnd/>
-              </a14:hiddenLine>
-            </a:ext>
-            <a:ext uri="{AF507438-7753-43E0-B8FC-AC1667EBCBE1}">
-              <a14:hiddenEffects xmlns:a14="http://schemas.microsoft.com/office/drawing/2010/main">
-                <a:effectLst>
-                  <a:outerShdw dist="35921" dir="2700000" algn="ctr" rotWithShape="0">
-                    <a:schemeClr val="bg2"/>
-                  </a:outerShdw>
-                </a:effectLst>
-              </a14:hiddenEffects>
-            </a:ext>
-          </a:extLst>
         </p:spPr>
-      </p:pic>
-      <p:pic>
-        <p:nvPicPr>
-          <p:cNvPr id="8196" name="Picture 4"/>
-          <p:cNvPicPr>
-            <a:picLocks noChangeAspect="1" noChangeArrowheads="1"/>
-          </p:cNvPicPr>
-          <p:nvPr/>
-        </p:nvPicPr>
-        <p:blipFill>
-          <a:blip r:embed="rId4">
-            <a:extLst>
-              <a:ext uri="{28A0092B-C50C-407E-A947-70E740481C1C}">
-                <a14:useLocalDpi xmlns:a14="http://schemas.microsoft.com/office/drawing/2010/main" val="0"/>
-              </a:ext>
-            </a:extLst>
-          </a:blip>
-          <a:srcRect/>
-          <a:stretch>
-            <a:fillRect/>
-          </a:stretch>
-        </p:blipFill>
-        <p:spPr bwMode="auto">
-          <a:xfrm>
-            <a:off x="4351428" y="2204864"/>
-            <a:ext cx="4119837" cy="3816424"/>
-          </a:xfrm>
-          <a:prstGeom prst="rect">
-            <a:avLst/>
-          </a:prstGeom>
-          <a:noFill/>
-          <a:ln>
-            <a:noFill/>
-          </a:ln>
-          <a:effectLst/>
-          <a:extLst>
-            <a:ext uri="{909E8E84-426E-40DD-AFC4-6F175D3DCCD1}">
-              <a14:hiddenFill xmlns:a14="http://schemas.microsoft.com/office/drawing/2010/main">
-                <a:solidFill>
-                  <a:schemeClr val="accent1"/>
-                </a:solidFill>
-              </a14:hiddenFill>
-            </a:ext>
-            <a:ext uri="{91240B29-F687-4F45-9708-019B960494DF}">
-              <a14:hiddenLine xmlns:a14="http://schemas.microsoft.com/office/drawing/2010/main" w="9525">
-                <a:solidFill>
-                  <a:schemeClr val="tx1"/>
-                </a:solidFill>
-                <a:miter lim="800000"/>
-                <a:headEnd/>
-                <a:tailEnd/>
-              </a14:hiddenLine>
-            </a:ext>
-            <a:ext uri="{AF507438-7753-43E0-B8FC-AC1667EBCBE1}">
-              <a14:hiddenEffects xmlns:a14="http://schemas.microsoft.com/office/drawing/2010/main">
-                <a:effectLst>
-                  <a:outerShdw dist="35921" dir="2700000" algn="ctr" rotWithShape="0">
-                    <a:schemeClr val="bg2"/>
-                  </a:outerShdw>
-                </a:effectLst>
-              </a14:hiddenEffects>
-            </a:ext>
-          </a:extLst>
-        </p:spPr>
-      </p:pic>
+        <p:txBody>
+          <a:bodyPr wrap="square" rtlCol="0">
+            <a:spAutoFit/>
+          </a:bodyPr>
+          <a:lstStyle/>
+          <a:p>
+            <a:r>
+              <a:rPr lang="en-US" b="1" dirty="0" smtClean="0"/>
+              <a:t>10 bins</a:t>
+            </a:r>
+          </a:p>
+          <a:p>
+            <a:r>
+              <a:rPr lang="en-US" b="1" dirty="0" smtClean="0"/>
+              <a:t>x-axis: </a:t>
+            </a:r>
+            <a:r>
+              <a:rPr lang="en-US" dirty="0" smtClean="0"/>
+              <a:t>score of mapping</a:t>
+            </a:r>
+          </a:p>
+          <a:p>
+            <a:r>
+              <a:rPr lang="en-US" b="1" dirty="0" smtClean="0"/>
+              <a:t>y-axis: </a:t>
+            </a:r>
+            <a:r>
+              <a:rPr lang="en-US" dirty="0" smtClean="0"/>
+              <a:t>number of reads in that bins</a:t>
+            </a:r>
+            <a:endParaRPr lang="en-GB" dirty="0"/>
+          </a:p>
+        </p:txBody>
+      </p:sp>
     </p:spTree>
     <p:extLst>
       <p:ext uri="{BB962C8B-B14F-4D97-AF65-F5344CB8AC3E}">
-        <p14:creationId xmlns:p14="http://schemas.microsoft.com/office/powerpoint/2010/main" val="532536579"/>
+        <p14:creationId xmlns:p14="http://schemas.microsoft.com/office/powerpoint/2010/main" val="670237913"/>
       </p:ext>
     </p:extLst>
   </p:cSld>

</xml_diff>